<commit_message>
Polishes all icons, e.g. making them transparent
</commit_message>
<xml_diff>
--- a/teaser/gui/guiimages/Buttons.pptx
+++ b/teaser/gui/guiimages/Buttons.pptx
@@ -6,6 +6,8 @@
   </p:sldMasterIdLst>
   <p:sldIdLst>
     <p:sldId id="256" r:id="rId2"/>
+    <p:sldId id="257" r:id="rId3"/>
+    <p:sldId id="258" r:id="rId4"/>
   </p:sldIdLst>
   <p:sldSz cx="9144000" cy="6858000" type="screen4x3"/>
   <p:notesSz cx="6858000" cy="9144000"/>
@@ -104,6 +106,22 @@
       </a:defRPr>
     </a:lvl9pPr>
   </p:defaultTextStyle>
+  <p:extLst>
+    <p:ext uri="{EFAFB233-063F-42B5-8137-9DF3F51BA10A}">
+      <p15:sldGuideLst xmlns:p15="http://schemas.microsoft.com/office/powerpoint/2012/main">
+        <p15:guide id="1" orient="horz" pos="2160">
+          <p15:clr>
+            <a:srgbClr val="A4A3A4"/>
+          </p15:clr>
+        </p15:guide>
+        <p15:guide id="2" pos="2880">
+          <p15:clr>
+            <a:srgbClr val="A4A3A4"/>
+          </p15:clr>
+        </p15:guide>
+      </p15:sldGuideLst>
+    </p:ext>
+  </p:extLst>
 </p:presentation>
 </file>
 
@@ -288,7 +306,7 @@
           <a:p>
             <a:fld id="{AB3D198D-43BD-491D-84C3-63BE996B60A5}" type="datetimeFigureOut">
               <a:rPr lang="de-DE" smtClean="0"/>
-              <a:t>31.07.2012</a:t>
+              <a:t>13.10.2016</a:t>
             </a:fld>
             <a:endParaRPr lang="de-DE"/>
           </a:p>
@@ -458,7 +476,7 @@
           <a:p>
             <a:fld id="{AB3D198D-43BD-491D-84C3-63BE996B60A5}" type="datetimeFigureOut">
               <a:rPr lang="de-DE" smtClean="0"/>
-              <a:t>31.07.2012</a:t>
+              <a:t>13.10.2016</a:t>
             </a:fld>
             <a:endParaRPr lang="de-DE"/>
           </a:p>
@@ -638,7 +656,7 @@
           <a:p>
             <a:fld id="{AB3D198D-43BD-491D-84C3-63BE996B60A5}" type="datetimeFigureOut">
               <a:rPr lang="de-DE" smtClean="0"/>
-              <a:t>31.07.2012</a:t>
+              <a:t>13.10.2016</a:t>
             </a:fld>
             <a:endParaRPr lang="de-DE"/>
           </a:p>
@@ -808,7 +826,7 @@
           <a:p>
             <a:fld id="{AB3D198D-43BD-491D-84C3-63BE996B60A5}" type="datetimeFigureOut">
               <a:rPr lang="de-DE" smtClean="0"/>
-              <a:t>31.07.2012</a:t>
+              <a:t>13.10.2016</a:t>
             </a:fld>
             <a:endParaRPr lang="de-DE"/>
           </a:p>
@@ -1054,7 +1072,7 @@
           <a:p>
             <a:fld id="{AB3D198D-43BD-491D-84C3-63BE996B60A5}" type="datetimeFigureOut">
               <a:rPr lang="de-DE" smtClean="0"/>
-              <a:t>31.07.2012</a:t>
+              <a:t>13.10.2016</a:t>
             </a:fld>
             <a:endParaRPr lang="de-DE"/>
           </a:p>
@@ -1342,7 +1360,7 @@
           <a:p>
             <a:fld id="{AB3D198D-43BD-491D-84C3-63BE996B60A5}" type="datetimeFigureOut">
               <a:rPr lang="de-DE" smtClean="0"/>
-              <a:t>31.07.2012</a:t>
+              <a:t>13.10.2016</a:t>
             </a:fld>
             <a:endParaRPr lang="de-DE"/>
           </a:p>
@@ -1764,7 +1782,7 @@
           <a:p>
             <a:fld id="{AB3D198D-43BD-491D-84C3-63BE996B60A5}" type="datetimeFigureOut">
               <a:rPr lang="de-DE" smtClean="0"/>
-              <a:t>31.07.2012</a:t>
+              <a:t>13.10.2016</a:t>
             </a:fld>
             <a:endParaRPr lang="de-DE"/>
           </a:p>
@@ -1882,7 +1900,7 @@
           <a:p>
             <a:fld id="{AB3D198D-43BD-491D-84C3-63BE996B60A5}" type="datetimeFigureOut">
               <a:rPr lang="de-DE" smtClean="0"/>
-              <a:t>31.07.2012</a:t>
+              <a:t>13.10.2016</a:t>
             </a:fld>
             <a:endParaRPr lang="de-DE"/>
           </a:p>
@@ -1977,7 +1995,7 @@
           <a:p>
             <a:fld id="{AB3D198D-43BD-491D-84C3-63BE996B60A5}" type="datetimeFigureOut">
               <a:rPr lang="de-DE" smtClean="0"/>
-              <a:t>31.07.2012</a:t>
+              <a:t>13.10.2016</a:t>
             </a:fld>
             <a:endParaRPr lang="de-DE"/>
           </a:p>
@@ -2254,7 +2272,7 @@
           <a:p>
             <a:fld id="{AB3D198D-43BD-491D-84C3-63BE996B60A5}" type="datetimeFigureOut">
               <a:rPr lang="de-DE" smtClean="0"/>
-              <a:t>31.07.2012</a:t>
+              <a:t>13.10.2016</a:t>
             </a:fld>
             <a:endParaRPr lang="de-DE"/>
           </a:p>
@@ -2507,7 +2525,7 @@
           <a:p>
             <a:fld id="{AB3D198D-43BD-491D-84C3-63BE996B60A5}" type="datetimeFigureOut">
               <a:rPr lang="de-DE" smtClean="0"/>
-              <a:t>31.07.2012</a:t>
+              <a:t>13.10.2016</a:t>
             </a:fld>
             <a:endParaRPr lang="de-DE"/>
           </a:p>
@@ -2720,7 +2738,7 @@
           <a:p>
             <a:fld id="{AB3D198D-43BD-491D-84C3-63BE996B60A5}" type="datetimeFigureOut">
               <a:rPr lang="de-DE" smtClean="0"/>
-              <a:t>31.07.2012</a:t>
+              <a:t>13.10.2016</a:t>
             </a:fld>
             <a:endParaRPr lang="de-DE"/>
           </a:p>
@@ -3402,6 +3420,1021 @@
     <p:extLst>
       <p:ext uri="{BB962C8B-B14F-4D97-AF65-F5344CB8AC3E}">
         <p14:creationId xmlns:p14="http://schemas.microsoft.com/office/powerpoint/2010/main" val="3421742092"/>
+      </p:ext>
+    </p:extLst>
+  </p:cSld>
+  <p:clrMapOvr>
+    <a:masterClrMapping/>
+  </p:clrMapOvr>
+</p:sld>
+</file>
+
+<file path=ppt/slides/slide2.xml><?xml version="1.0" encoding="utf-8"?>
+<p:sld xmlns:a="http://schemas.openxmlformats.org/drawingml/2006/main" xmlns:r="http://schemas.openxmlformats.org/officeDocument/2006/relationships" xmlns:p="http://schemas.openxmlformats.org/presentationml/2006/main">
+  <p:cSld>
+    <p:spTree>
+      <p:nvGrpSpPr>
+        <p:cNvPr id="1" name=""/>
+        <p:cNvGrpSpPr/>
+        <p:nvPr/>
+      </p:nvGrpSpPr>
+      <p:grpSpPr>
+        <a:xfrm>
+          <a:off x="0" y="0"/>
+          <a:ext cx="0" cy="0"/>
+          <a:chOff x="0" y="0"/>
+          <a:chExt cx="0" cy="0"/>
+        </a:xfrm>
+      </p:grpSpPr>
+      <p:pic>
+        <p:nvPicPr>
+          <p:cNvPr id="24" name="Grafik 23"/>
+          <p:cNvPicPr>
+            <a:picLocks noChangeAspect="1"/>
+          </p:cNvPicPr>
+          <p:nvPr/>
+        </p:nvPicPr>
+        <p:blipFill>
+          <a:blip r:embed="rId2">
+            <a:clrChange>
+              <a:clrFrom>
+                <a:srgbClr val="FFFFFF"/>
+              </a:clrFrom>
+              <a:clrTo>
+                <a:srgbClr val="FFFFFF">
+                  <a:alpha val="0"/>
+                </a:srgbClr>
+              </a:clrTo>
+            </a:clrChange>
+          </a:blip>
+          <a:stretch>
+            <a:fillRect/>
+          </a:stretch>
+        </p:blipFill>
+        <p:spPr>
+          <a:xfrm>
+            <a:off x="2771800" y="4588984"/>
+            <a:ext cx="1231122" cy="1206622"/>
+          </a:xfrm>
+          <a:prstGeom prst="rect">
+            <a:avLst/>
+          </a:prstGeom>
+        </p:spPr>
+      </p:pic>
+      <p:pic>
+        <p:nvPicPr>
+          <p:cNvPr id="4" name="Picture 2" descr="N:\Forschung\EBC0041_gGmbH_Retrofit_matrix_ghi\Daten\1.Retrofit Matrix\3. grafische Darstellung\Pikto_ghi Kopie.jpg"/>
+          <p:cNvPicPr>
+            <a:picLocks noChangeAspect="1" noChangeArrowheads="1"/>
+          </p:cNvPicPr>
+          <p:nvPr/>
+        </p:nvPicPr>
+        <p:blipFill>
+          <a:blip r:embed="rId3" cstate="print">
+            <a:clrChange>
+              <a:clrFrom>
+                <a:srgbClr val="FEFEFE"/>
+              </a:clrFrom>
+              <a:clrTo>
+                <a:srgbClr val="FEFEFE">
+                  <a:alpha val="0"/>
+                </a:srgbClr>
+              </a:clrTo>
+            </a:clrChange>
+            <a:extLst>
+              <a:ext uri="{28A0092B-C50C-407E-A947-70E740481C1C}">
+                <a14:useLocalDpi xmlns:a14="http://schemas.microsoft.com/office/drawing/2010/main" val="0"/>
+              </a:ext>
+            </a:extLst>
+          </a:blip>
+          <a:srcRect/>
+          <a:stretch>
+            <a:fillRect/>
+          </a:stretch>
+        </p:blipFill>
+        <p:spPr bwMode="auto">
+          <a:xfrm>
+            <a:off x="683568" y="548680"/>
+            <a:ext cx="1224136" cy="1198766"/>
+          </a:xfrm>
+          <a:prstGeom prst="rect">
+            <a:avLst/>
+          </a:prstGeom>
+          <a:noFill/>
+          <a:extLst>
+            <a:ext uri="{909E8E84-426E-40DD-AFC4-6F175D3DCCD1}">
+              <a14:hiddenFill xmlns:a14="http://schemas.microsoft.com/office/drawing/2010/main">
+                <a:solidFill>
+                  <a:srgbClr val="FFFFFF"/>
+                </a:solidFill>
+              </a14:hiddenFill>
+            </a:ext>
+          </a:extLst>
+        </p:spPr>
+      </p:pic>
+      <p:pic>
+        <p:nvPicPr>
+          <p:cNvPr id="5" name="Picture 2" descr="N:\Forschung\EBC0041_gGmbH_Retrofit_matrix_ghi\Daten\1.Retrofit Matrix\3. grafische Darstellung\Pikto_ghi Kopie.jpg"/>
+          <p:cNvPicPr>
+            <a:picLocks noChangeAspect="1" noChangeArrowheads="1"/>
+          </p:cNvPicPr>
+          <p:nvPr/>
+        </p:nvPicPr>
+        <p:blipFill>
+          <a:blip r:embed="rId3" cstate="print">
+            <a:clrChange>
+              <a:clrFrom>
+                <a:srgbClr val="FEFEFE"/>
+              </a:clrFrom>
+              <a:clrTo>
+                <a:srgbClr val="FEFEFE">
+                  <a:alpha val="0"/>
+                </a:srgbClr>
+              </a:clrTo>
+            </a:clrChange>
+            <a:extLst>
+              <a:ext uri="{28A0092B-C50C-407E-A947-70E740481C1C}">
+                <a14:useLocalDpi xmlns:a14="http://schemas.microsoft.com/office/drawing/2010/main" val="0"/>
+              </a:ext>
+            </a:extLst>
+          </a:blip>
+          <a:srcRect/>
+          <a:stretch>
+            <a:fillRect/>
+          </a:stretch>
+        </p:blipFill>
+        <p:spPr bwMode="auto">
+          <a:xfrm>
+            <a:off x="2699792" y="548680"/>
+            <a:ext cx="1224136" cy="1198766"/>
+          </a:xfrm>
+          <a:prstGeom prst="rect">
+            <a:avLst/>
+          </a:prstGeom>
+          <a:noFill/>
+          <a:extLst>
+            <a:ext uri="{909E8E84-426E-40DD-AFC4-6F175D3DCCD1}">
+              <a14:hiddenFill xmlns:a14="http://schemas.microsoft.com/office/drawing/2010/main">
+                <a:solidFill>
+                  <a:srgbClr val="FFFFFF"/>
+                </a:solidFill>
+              </a14:hiddenFill>
+            </a:ext>
+          </a:extLst>
+        </p:spPr>
+      </p:pic>
+      <p:sp>
+        <p:nvSpPr>
+          <p:cNvPr id="7" name="Rechteck 6"/>
+          <p:cNvSpPr/>
+          <p:nvPr/>
+        </p:nvSpPr>
+        <p:spPr>
+          <a:xfrm>
+            <a:off x="2912527" y="1033002"/>
+            <a:ext cx="576064" cy="648072"/>
+          </a:xfrm>
+          <a:prstGeom prst="rect">
+            <a:avLst/>
+          </a:prstGeom>
+          <a:solidFill>
+            <a:schemeClr val="bg1"/>
+          </a:solidFill>
+          <a:ln>
+            <a:solidFill>
+              <a:schemeClr val="bg1"/>
+            </a:solidFill>
+          </a:ln>
+        </p:spPr>
+        <p:style>
+          <a:lnRef idx="2">
+            <a:schemeClr val="accent1">
+              <a:shade val="50000"/>
+            </a:schemeClr>
+          </a:lnRef>
+          <a:fillRef idx="1">
+            <a:schemeClr val="accent1"/>
+          </a:fillRef>
+          <a:effectRef idx="0">
+            <a:schemeClr val="accent1"/>
+          </a:effectRef>
+          <a:fontRef idx="minor">
+            <a:schemeClr val="lt1"/>
+          </a:fontRef>
+        </p:style>
+        <p:txBody>
+          <a:bodyPr rtlCol="0" anchor="ctr"/>
+          <a:lstStyle/>
+          <a:p>
+            <a:pPr algn="ctr"/>
+            <a:endParaRPr lang="de-DE"/>
+          </a:p>
+        </p:txBody>
+      </p:sp>
+      <p:pic>
+        <p:nvPicPr>
+          <p:cNvPr id="8" name="Picture 2" descr="N:\Forschung\EBC0041_gGmbH_Retrofit_matrix_ghi\Daten\1.Retrofit Matrix\3. grafische Darstellung\Pikto_ghi Kopie.jpg"/>
+          <p:cNvPicPr>
+            <a:picLocks noChangeAspect="1" noChangeArrowheads="1"/>
+          </p:cNvPicPr>
+          <p:nvPr/>
+        </p:nvPicPr>
+        <p:blipFill>
+          <a:blip r:embed="rId4" cstate="print">
+            <a:clrChange>
+              <a:clrFrom>
+                <a:srgbClr val="FEFEFE"/>
+              </a:clrFrom>
+              <a:clrTo>
+                <a:srgbClr val="FEFEFE">
+                  <a:alpha val="0"/>
+                </a:srgbClr>
+              </a:clrTo>
+            </a:clrChange>
+            <a:extLst>
+              <a:ext uri="{BEBA8EAE-BF5A-486C-A8C5-ECC9F3942E4B}">
+                <a14:imgProps xmlns:a14="http://schemas.microsoft.com/office/drawing/2010/main">
+                  <a14:imgLayer r:embed="rId5">
+                    <a14:imgEffect>
+                      <a14:saturation sat="0"/>
+                    </a14:imgEffect>
+                  </a14:imgLayer>
+                </a14:imgProps>
+              </a:ext>
+              <a:ext uri="{28A0092B-C50C-407E-A947-70E740481C1C}">
+                <a14:useLocalDpi xmlns:a14="http://schemas.microsoft.com/office/drawing/2010/main" val="0"/>
+              </a:ext>
+            </a:extLst>
+          </a:blip>
+          <a:srcRect/>
+          <a:stretch>
+            <a:fillRect/>
+          </a:stretch>
+        </p:blipFill>
+        <p:spPr bwMode="auto">
+          <a:xfrm>
+            <a:off x="4644008" y="548680"/>
+            <a:ext cx="1224136" cy="1198766"/>
+          </a:xfrm>
+          <a:prstGeom prst="rect">
+            <a:avLst/>
+          </a:prstGeom>
+          <a:noFill/>
+          <a:extLst>
+            <a:ext uri="{909E8E84-426E-40DD-AFC4-6F175D3DCCD1}">
+              <a14:hiddenFill xmlns:a14="http://schemas.microsoft.com/office/drawing/2010/main">
+                <a:solidFill>
+                  <a:srgbClr val="FFFFFF"/>
+                </a:solidFill>
+              </a14:hiddenFill>
+            </a:ext>
+          </a:extLst>
+        </p:spPr>
+      </p:pic>
+      <p:pic>
+        <p:nvPicPr>
+          <p:cNvPr id="10" name="Picture 2" descr="N:\Forschung\EBC0041_gGmbH_Retrofit_matrix_ghi\Daten\1.Retrofit Matrix\3. grafische Darstellung\Pikto_ghi Kopie.jpg"/>
+          <p:cNvPicPr>
+            <a:picLocks noChangeAspect="1" noChangeArrowheads="1"/>
+          </p:cNvPicPr>
+          <p:nvPr/>
+        </p:nvPicPr>
+        <p:blipFill>
+          <a:blip r:embed="rId6" cstate="print">
+            <a:clrChange>
+              <a:clrFrom>
+                <a:srgbClr val="FFFEFD"/>
+              </a:clrFrom>
+              <a:clrTo>
+                <a:srgbClr val="FFFEFD">
+                  <a:alpha val="0"/>
+                </a:srgbClr>
+              </a:clrTo>
+            </a:clrChange>
+            <a:biLevel thresh="75000"/>
+            <a:extLst>
+              <a:ext uri="{BEBA8EAE-BF5A-486C-A8C5-ECC9F3942E4B}">
+                <a14:imgProps xmlns:a14="http://schemas.microsoft.com/office/drawing/2010/main">
+                  <a14:imgLayer r:embed="rId5">
+                    <a14:imgEffect>
+                      <a14:artisticGlass scaling="100"/>
+                    </a14:imgEffect>
+                  </a14:imgLayer>
+                </a14:imgProps>
+              </a:ext>
+              <a:ext uri="{28A0092B-C50C-407E-A947-70E740481C1C}">
+                <a14:useLocalDpi xmlns:a14="http://schemas.microsoft.com/office/drawing/2010/main" val="0"/>
+              </a:ext>
+            </a:extLst>
+          </a:blip>
+          <a:srcRect/>
+          <a:stretch>
+            <a:fillRect/>
+          </a:stretch>
+        </p:blipFill>
+        <p:spPr bwMode="auto">
+          <a:xfrm>
+            <a:off x="6732240" y="548680"/>
+            <a:ext cx="1224136" cy="1198766"/>
+          </a:xfrm>
+          <a:prstGeom prst="rect">
+            <a:avLst/>
+          </a:prstGeom>
+          <a:noFill/>
+          <a:effectLst>
+            <a:softEdge rad="0"/>
+          </a:effectLst>
+          <a:extLst>
+            <a:ext uri="{909E8E84-426E-40DD-AFC4-6F175D3DCCD1}">
+              <a14:hiddenFill xmlns:a14="http://schemas.microsoft.com/office/drawing/2010/main">
+                <a:solidFill>
+                  <a:srgbClr val="FFFFFF"/>
+                </a:solidFill>
+              </a14:hiddenFill>
+            </a:ext>
+          </a:extLst>
+        </p:spPr>
+      </p:pic>
+      <p:pic>
+        <p:nvPicPr>
+          <p:cNvPr id="11" name="Picture 2" descr="N:\Forschung\EBC0041_gGmbH_Retrofit_matrix_ghi\Daten\1.Retrofit Matrix\3. grafische Darstellung\Pikto_ghi Kopie.jpg"/>
+          <p:cNvPicPr>
+            <a:picLocks noChangeAspect="1" noChangeArrowheads="1"/>
+          </p:cNvPicPr>
+          <p:nvPr/>
+        </p:nvPicPr>
+        <p:blipFill>
+          <a:blip r:embed="rId3" cstate="print">
+            <a:extLst>
+              <a:ext uri="{28A0092B-C50C-407E-A947-70E740481C1C}">
+                <a14:useLocalDpi xmlns:a14="http://schemas.microsoft.com/office/drawing/2010/main" val="0"/>
+              </a:ext>
+            </a:extLst>
+          </a:blip>
+          <a:srcRect/>
+          <a:stretch>
+            <a:fillRect/>
+          </a:stretch>
+        </p:blipFill>
+        <p:spPr bwMode="auto">
+          <a:xfrm>
+            <a:off x="683568" y="2564904"/>
+            <a:ext cx="1224136" cy="1198766"/>
+          </a:xfrm>
+          <a:prstGeom prst="rect">
+            <a:avLst/>
+          </a:prstGeom>
+          <a:noFill/>
+          <a:extLst>
+            <a:ext uri="{909E8E84-426E-40DD-AFC4-6F175D3DCCD1}">
+              <a14:hiddenFill xmlns:a14="http://schemas.microsoft.com/office/drawing/2010/main">
+                <a:solidFill>
+                  <a:srgbClr val="FFFFFF"/>
+                </a:solidFill>
+              </a14:hiddenFill>
+            </a:ext>
+          </a:extLst>
+        </p:spPr>
+      </p:pic>
+      <p:sp>
+        <p:nvSpPr>
+          <p:cNvPr id="12" name="Rechteck 11"/>
+          <p:cNvSpPr/>
+          <p:nvPr/>
+        </p:nvSpPr>
+        <p:spPr>
+          <a:xfrm>
+            <a:off x="887914" y="3057615"/>
+            <a:ext cx="576064" cy="648072"/>
+          </a:xfrm>
+          <a:prstGeom prst="rect">
+            <a:avLst/>
+          </a:prstGeom>
+          <a:solidFill>
+            <a:schemeClr val="bg1"/>
+          </a:solidFill>
+          <a:ln>
+            <a:solidFill>
+              <a:schemeClr val="bg1"/>
+            </a:solidFill>
+          </a:ln>
+        </p:spPr>
+        <p:style>
+          <a:lnRef idx="2">
+            <a:schemeClr val="accent1">
+              <a:shade val="50000"/>
+            </a:schemeClr>
+          </a:lnRef>
+          <a:fillRef idx="1">
+            <a:schemeClr val="accent1"/>
+          </a:fillRef>
+          <a:effectRef idx="0">
+            <a:schemeClr val="accent1"/>
+          </a:effectRef>
+          <a:fontRef idx="minor">
+            <a:schemeClr val="lt1"/>
+          </a:fontRef>
+        </p:style>
+        <p:txBody>
+          <a:bodyPr rtlCol="0" anchor="ctr"/>
+          <a:lstStyle/>
+          <a:p>
+            <a:pPr algn="ctr"/>
+            <a:endParaRPr lang="de-DE"/>
+          </a:p>
+        </p:txBody>
+      </p:sp>
+      <p:pic>
+        <p:nvPicPr>
+          <p:cNvPr id="17" name="Grafik 16"/>
+          <p:cNvPicPr>
+            <a:picLocks noChangeAspect="1"/>
+          </p:cNvPicPr>
+          <p:nvPr/>
+        </p:nvPicPr>
+        <p:blipFill>
+          <a:blip r:embed="rId2">
+            <a:clrChange>
+              <a:clrFrom>
+                <a:srgbClr val="FFFFFF"/>
+              </a:clrFrom>
+              <a:clrTo>
+                <a:srgbClr val="FFFFFF">
+                  <a:alpha val="0"/>
+                </a:srgbClr>
+              </a:clrTo>
+            </a:clrChange>
+          </a:blip>
+          <a:stretch>
+            <a:fillRect/>
+          </a:stretch>
+        </p:blipFill>
+        <p:spPr>
+          <a:xfrm>
+            <a:off x="2699792" y="2564904"/>
+            <a:ext cx="1231122" cy="1206622"/>
+          </a:xfrm>
+          <a:prstGeom prst="rect">
+            <a:avLst/>
+          </a:prstGeom>
+        </p:spPr>
+      </p:pic>
+      <p:grpSp>
+        <p:nvGrpSpPr>
+          <p:cNvPr id="31" name="Gruppieren 30"/>
+          <p:cNvGrpSpPr>
+            <a:grpSpLocks noChangeAspect="1"/>
+          </p:cNvGrpSpPr>
+          <p:nvPr/>
+        </p:nvGrpSpPr>
+        <p:grpSpPr>
+          <a:xfrm>
+            <a:off x="4644008" y="2509674"/>
+            <a:ext cx="1224137" cy="1221178"/>
+            <a:chOff x="4723002" y="2228515"/>
+            <a:chExt cx="1760703" cy="1756447"/>
+          </a:xfrm>
+        </p:grpSpPr>
+        <p:pic>
+          <p:nvPicPr>
+            <p:cNvPr id="18" name="Grafik 17"/>
+            <p:cNvPicPr>
+              <a:picLocks noChangeAspect="1"/>
+            </p:cNvPicPr>
+            <p:nvPr/>
+          </p:nvPicPr>
+          <p:blipFill>
+            <a:blip r:embed="rId2">
+              <a:clrChange>
+                <a:clrFrom>
+                  <a:srgbClr val="FFFFFF"/>
+                </a:clrFrom>
+                <a:clrTo>
+                  <a:srgbClr val="FFFFFF">
+                    <a:alpha val="0"/>
+                  </a:srgbClr>
+                </a:clrTo>
+              </a:clrChange>
+            </a:blip>
+            <a:stretch>
+              <a:fillRect/>
+            </a:stretch>
+          </p:blipFill>
+          <p:spPr>
+            <a:xfrm>
+              <a:off x="4723002" y="2228515"/>
+              <a:ext cx="1231122" cy="1206623"/>
+            </a:xfrm>
+            <a:prstGeom prst="rect">
+              <a:avLst/>
+            </a:prstGeom>
+          </p:spPr>
+        </p:pic>
+        <p:pic>
+          <p:nvPicPr>
+            <p:cNvPr id="19" name="Grafik 18"/>
+            <p:cNvPicPr>
+              <a:picLocks noChangeAspect="1"/>
+            </p:cNvPicPr>
+            <p:nvPr/>
+          </p:nvPicPr>
+          <p:blipFill>
+            <a:blip r:embed="rId2">
+              <a:clrChange>
+                <a:clrFrom>
+                  <a:srgbClr val="FFFFFF"/>
+                </a:clrFrom>
+                <a:clrTo>
+                  <a:srgbClr val="FFFFFF">
+                    <a:alpha val="0"/>
+                  </a:srgbClr>
+                </a:clrTo>
+              </a:clrChange>
+            </a:blip>
+            <a:stretch>
+              <a:fillRect/>
+            </a:stretch>
+          </p:blipFill>
+          <p:spPr>
+            <a:xfrm>
+              <a:off x="5252583" y="2778340"/>
+              <a:ext cx="1231122" cy="1206622"/>
+            </a:xfrm>
+            <a:prstGeom prst="rect">
+              <a:avLst/>
+            </a:prstGeom>
+          </p:spPr>
+        </p:pic>
+      </p:grpSp>
+      <p:grpSp>
+        <p:nvGrpSpPr>
+          <p:cNvPr id="32" name="Gruppieren 31"/>
+          <p:cNvGrpSpPr>
+            <a:grpSpLocks/>
+          </p:cNvGrpSpPr>
+          <p:nvPr/>
+        </p:nvGrpSpPr>
+        <p:grpSpPr>
+          <a:xfrm>
+            <a:off x="6660241" y="2472917"/>
+            <a:ext cx="1203572" cy="1205926"/>
+            <a:chOff x="6939672" y="2200381"/>
+            <a:chExt cx="1776702" cy="1780181"/>
+          </a:xfrm>
+        </p:grpSpPr>
+        <p:pic>
+          <p:nvPicPr>
+            <p:cNvPr id="21" name="Picture 2" descr="N:\Forschung\EBC0041_gGmbH_Retrofit_matrix_ghi\Daten\1.Retrofit Matrix\3. grafische Darstellung\Pikto_ghi Kopie.jpg"/>
+            <p:cNvPicPr>
+              <a:picLocks noChangeAspect="1" noChangeArrowheads="1"/>
+            </p:cNvPicPr>
+            <p:nvPr/>
+          </p:nvPicPr>
+          <p:blipFill>
+            <a:blip r:embed="rId3" cstate="print">
+              <a:clrChange>
+                <a:clrFrom>
+                  <a:srgbClr val="FEFEFE"/>
+                </a:clrFrom>
+                <a:clrTo>
+                  <a:srgbClr val="FEFEFE">
+                    <a:alpha val="0"/>
+                  </a:srgbClr>
+                </a:clrTo>
+              </a:clrChange>
+              <a:extLst>
+                <a:ext uri="{28A0092B-C50C-407E-A947-70E740481C1C}">
+                  <a14:useLocalDpi xmlns:a14="http://schemas.microsoft.com/office/drawing/2010/main" val="0"/>
+                </a:ext>
+              </a:extLst>
+            </a:blip>
+            <a:srcRect/>
+            <a:stretch>
+              <a:fillRect/>
+            </a:stretch>
+          </p:blipFill>
+          <p:spPr bwMode="auto">
+            <a:xfrm>
+              <a:off x="6939672" y="2200381"/>
+              <a:ext cx="1224135" cy="1198767"/>
+            </a:xfrm>
+            <a:prstGeom prst="rect">
+              <a:avLst/>
+            </a:prstGeom>
+            <a:noFill/>
+            <a:extLst>
+              <a:ext uri="{909E8E84-426E-40DD-AFC4-6F175D3DCCD1}">
+                <a14:hiddenFill xmlns:a14="http://schemas.microsoft.com/office/drawing/2010/main">
+                  <a:solidFill>
+                    <a:srgbClr val="FFFFFF"/>
+                  </a:solidFill>
+                </a14:hiddenFill>
+              </a:ext>
+            </a:extLst>
+          </p:spPr>
+        </p:pic>
+        <p:pic>
+          <p:nvPicPr>
+            <p:cNvPr id="22" name="Picture 2" descr="N:\Forschung\EBC0041_gGmbH_Retrofit_matrix_ghi\Daten\1.Retrofit Matrix\3. grafische Darstellung\Pikto_ghi Kopie.jpg"/>
+            <p:cNvPicPr>
+              <a:picLocks noChangeAspect="1" noChangeArrowheads="1"/>
+            </p:cNvPicPr>
+            <p:nvPr/>
+          </p:nvPicPr>
+          <p:blipFill>
+            <a:blip r:embed="rId3" cstate="print">
+              <a:clrChange>
+                <a:clrFrom>
+                  <a:srgbClr val="FEFEFE"/>
+                </a:clrFrom>
+                <a:clrTo>
+                  <a:srgbClr val="FEFEFE">
+                    <a:alpha val="0"/>
+                  </a:srgbClr>
+                </a:clrTo>
+              </a:clrChange>
+              <a:extLst>
+                <a:ext uri="{28A0092B-C50C-407E-A947-70E740481C1C}">
+                  <a14:useLocalDpi xmlns:a14="http://schemas.microsoft.com/office/drawing/2010/main" val="0"/>
+                </a:ext>
+              </a:extLst>
+            </a:blip>
+            <a:srcRect/>
+            <a:stretch>
+              <a:fillRect/>
+            </a:stretch>
+          </p:blipFill>
+          <p:spPr bwMode="auto">
+            <a:xfrm>
+              <a:off x="7492721" y="2782269"/>
+              <a:ext cx="1223653" cy="1198293"/>
+            </a:xfrm>
+            <a:prstGeom prst="rect">
+              <a:avLst/>
+            </a:prstGeom>
+            <a:noFill/>
+            <a:extLst>
+              <a:ext uri="{909E8E84-426E-40DD-AFC4-6F175D3DCCD1}">
+                <a14:hiddenFill xmlns:a14="http://schemas.microsoft.com/office/drawing/2010/main">
+                  <a:solidFill>
+                    <a:srgbClr val="FFFFFF"/>
+                  </a:solidFill>
+                </a14:hiddenFill>
+              </a:ext>
+            </a:extLst>
+          </p:spPr>
+        </p:pic>
+      </p:grpSp>
+      <p:pic>
+        <p:nvPicPr>
+          <p:cNvPr id="23" name="Picture 2" descr="U:\Angis_Assis\Mitarbeiter\Peter_Remmen\TeaserSkizze\Piktogramme\Zahnrad.emf"/>
+          <p:cNvPicPr>
+            <a:picLocks noChangeAspect="1" noChangeArrowheads="1"/>
+          </p:cNvPicPr>
+          <p:nvPr/>
+        </p:nvPicPr>
+        <p:blipFill>
+          <a:blip r:embed="rId7">
+            <a:extLst>
+              <a:ext uri="{28A0092B-C50C-407E-A947-70E740481C1C}">
+                <a14:useLocalDpi xmlns:a14="http://schemas.microsoft.com/office/drawing/2010/main" val="0"/>
+              </a:ext>
+            </a:extLst>
+          </a:blip>
+          <a:srcRect/>
+          <a:stretch>
+            <a:fillRect/>
+          </a:stretch>
+        </p:blipFill>
+        <p:spPr bwMode="auto">
+          <a:xfrm rot="21065692">
+            <a:off x="3023933" y="5209073"/>
+            <a:ext cx="508742" cy="535109"/>
+          </a:xfrm>
+          <a:prstGeom prst="rect">
+            <a:avLst/>
+          </a:prstGeom>
+          <a:noFill/>
+          <a:extLst>
+            <a:ext uri="{909E8E84-426E-40DD-AFC4-6F175D3DCCD1}">
+              <a14:hiddenFill xmlns:a14="http://schemas.microsoft.com/office/drawing/2010/main">
+                <a:solidFill>
+                  <a:srgbClr val="FFFFFF"/>
+                </a:solidFill>
+              </a14:hiddenFill>
+            </a:ext>
+          </a:extLst>
+        </p:spPr>
+      </p:pic>
+      <p:pic>
+        <p:nvPicPr>
+          <p:cNvPr id="25" name="Picture 2" descr="U:\Angis_Assis\Mitarbeiter\Peter_Remmen\TeaserSkizze\Piktogramme\Zahnrad.emf"/>
+          <p:cNvPicPr>
+            <a:picLocks noChangeAspect="1" noChangeArrowheads="1"/>
+          </p:cNvPicPr>
+          <p:nvPr/>
+        </p:nvPicPr>
+        <p:blipFill>
+          <a:blip r:embed="rId7">
+            <a:extLst>
+              <a:ext uri="{28A0092B-C50C-407E-A947-70E740481C1C}">
+                <a14:useLocalDpi xmlns:a14="http://schemas.microsoft.com/office/drawing/2010/main" val="0"/>
+              </a:ext>
+            </a:extLst>
+          </a:blip>
+          <a:srcRect/>
+          <a:stretch>
+            <a:fillRect/>
+          </a:stretch>
+        </p:blipFill>
+        <p:spPr bwMode="auto">
+          <a:xfrm>
+            <a:off x="3269843" y="4780374"/>
+            <a:ext cx="508742" cy="535109"/>
+          </a:xfrm>
+          <a:prstGeom prst="rect">
+            <a:avLst/>
+          </a:prstGeom>
+          <a:noFill/>
+          <a:extLst>
+            <a:ext uri="{909E8E84-426E-40DD-AFC4-6F175D3DCCD1}">
+              <a14:hiddenFill xmlns:a14="http://schemas.microsoft.com/office/drawing/2010/main">
+                <a:solidFill>
+                  <a:srgbClr val="FFFFFF"/>
+                </a:solidFill>
+              </a14:hiddenFill>
+            </a:ext>
+          </a:extLst>
+        </p:spPr>
+      </p:pic>
+      <p:pic>
+        <p:nvPicPr>
+          <p:cNvPr id="28" name="Grafik 27"/>
+          <p:cNvPicPr>
+            <a:picLocks noChangeAspect="1"/>
+          </p:cNvPicPr>
+          <p:nvPr/>
+        </p:nvPicPr>
+        <p:blipFill>
+          <a:blip r:embed="rId2">
+            <a:clrChange>
+              <a:clrFrom>
+                <a:srgbClr val="FFFFFF"/>
+              </a:clrFrom>
+              <a:clrTo>
+                <a:srgbClr val="FFFFFF">
+                  <a:alpha val="0"/>
+                </a:srgbClr>
+              </a:clrTo>
+            </a:clrChange>
+          </a:blip>
+          <a:stretch>
+            <a:fillRect/>
+          </a:stretch>
+        </p:blipFill>
+        <p:spPr>
+          <a:xfrm>
+            <a:off x="5148064" y="4588984"/>
+            <a:ext cx="1231122" cy="1206622"/>
+          </a:xfrm>
+          <a:prstGeom prst="rect">
+            <a:avLst/>
+          </a:prstGeom>
+        </p:spPr>
+      </p:pic>
+      <p:pic>
+        <p:nvPicPr>
+          <p:cNvPr id="29" name="Grafik 28"/>
+          <p:cNvPicPr>
+            <a:picLocks noChangeAspect="1"/>
+          </p:cNvPicPr>
+          <p:nvPr/>
+        </p:nvPicPr>
+        <p:blipFill>
+          <a:blip r:embed="rId2">
+            <a:clrChange>
+              <a:clrFrom>
+                <a:srgbClr val="FFFFFF"/>
+              </a:clrFrom>
+              <a:clrTo>
+                <a:srgbClr val="FFFFFF">
+                  <a:alpha val="0"/>
+                </a:srgbClr>
+              </a:clrTo>
+            </a:clrChange>
+          </a:blip>
+          <a:stretch>
+            <a:fillRect/>
+          </a:stretch>
+        </p:blipFill>
+        <p:spPr>
+          <a:xfrm>
+            <a:off x="5356959" y="4718158"/>
+            <a:ext cx="836883" cy="820229"/>
+          </a:xfrm>
+          <a:prstGeom prst="rect">
+            <a:avLst/>
+          </a:prstGeom>
+        </p:spPr>
+      </p:pic>
+      <p:pic>
+        <p:nvPicPr>
+          <p:cNvPr id="30" name="Grafik 29"/>
+          <p:cNvPicPr>
+            <a:picLocks noChangeAspect="1"/>
+          </p:cNvPicPr>
+          <p:nvPr/>
+        </p:nvPicPr>
+        <p:blipFill>
+          <a:blip r:embed="rId2">
+            <a:clrChange>
+              <a:clrFrom>
+                <a:srgbClr val="FFFFFF"/>
+              </a:clrFrom>
+              <a:clrTo>
+                <a:srgbClr val="FFFFFF">
+                  <a:alpha val="0"/>
+                </a:srgbClr>
+              </a:clrTo>
+            </a:clrChange>
+          </a:blip>
+          <a:stretch>
+            <a:fillRect/>
+          </a:stretch>
+        </p:blipFill>
+        <p:spPr>
+          <a:xfrm>
+            <a:off x="5529777" y="4825197"/>
+            <a:ext cx="495667" cy="485803"/>
+          </a:xfrm>
+          <a:prstGeom prst="rect">
+            <a:avLst/>
+          </a:prstGeom>
+        </p:spPr>
+      </p:pic>
+      <p:pic>
+        <p:nvPicPr>
+          <p:cNvPr id="33" name="Picture 2" descr="N:\Forschung\EBC0041_gGmbH_Retrofit_matrix_ghi\Daten\1.Retrofit Matrix\3. grafische Darstellung\Pikto_ghi Kopie.jpg"/>
+          <p:cNvPicPr>
+            <a:picLocks noChangeAspect="1" noChangeArrowheads="1"/>
+          </p:cNvPicPr>
+          <p:nvPr/>
+        </p:nvPicPr>
+        <p:blipFill rotWithShape="1">
+          <a:blip r:embed="rId3" cstate="print">
+            <a:clrChange>
+              <a:clrFrom>
+                <a:srgbClr val="FEFEFE"/>
+              </a:clrFrom>
+              <a:clrTo>
+                <a:srgbClr val="FEFEFE">
+                  <a:alpha val="0"/>
+                </a:srgbClr>
+              </a:clrTo>
+            </a:clrChange>
+            <a:extLst>
+              <a:ext uri="{28A0092B-C50C-407E-A947-70E740481C1C}">
+                <a14:useLocalDpi xmlns:a14="http://schemas.microsoft.com/office/drawing/2010/main" val="0"/>
+              </a:ext>
+            </a:extLst>
+          </a:blip>
+          <a:srcRect l="16943" t="43255" r="30115" b="5412"/>
+          <a:stretch/>
+        </p:blipFill>
+        <p:spPr bwMode="auto">
+          <a:xfrm>
+            <a:off x="7236294" y="5094709"/>
+            <a:ext cx="900000" cy="854572"/>
+          </a:xfrm>
+          <a:prstGeom prst="rect">
+            <a:avLst/>
+          </a:prstGeom>
+          <a:noFill/>
+          <a:extLst>
+            <a:ext uri="{909E8E84-426E-40DD-AFC4-6F175D3DCCD1}">
+              <a14:hiddenFill xmlns:a14="http://schemas.microsoft.com/office/drawing/2010/main">
+                <a:solidFill>
+                  <a:srgbClr val="FFFFFF"/>
+                </a:solidFill>
+              </a14:hiddenFill>
+            </a:ext>
+          </a:extLst>
+        </p:spPr>
+      </p:pic>
+    </p:spTree>
+    <p:extLst>
+      <p:ext uri="{BB962C8B-B14F-4D97-AF65-F5344CB8AC3E}">
+        <p14:creationId xmlns:p14="http://schemas.microsoft.com/office/powerpoint/2010/main" val="945864124"/>
+      </p:ext>
+    </p:extLst>
+  </p:cSld>
+  <p:clrMapOvr>
+    <a:masterClrMapping/>
+  </p:clrMapOvr>
+</p:sld>
+</file>
+
+<file path=ppt/slides/slide3.xml><?xml version="1.0" encoding="utf-8"?>
+<p:sld xmlns:a="http://schemas.openxmlformats.org/drawingml/2006/main" xmlns:r="http://schemas.openxmlformats.org/officeDocument/2006/relationships" xmlns:p="http://schemas.openxmlformats.org/presentationml/2006/main">
+  <p:cSld>
+    <p:spTree>
+      <p:nvGrpSpPr>
+        <p:cNvPr id="1" name=""/>
+        <p:cNvGrpSpPr/>
+        <p:nvPr/>
+      </p:nvGrpSpPr>
+      <p:grpSpPr>
+        <a:xfrm>
+          <a:off x="0" y="0"/>
+          <a:ext cx="0" cy="0"/>
+          <a:chOff x="0" y="0"/>
+          <a:chExt cx="0" cy="0"/>
+        </a:xfrm>
+      </p:grpSpPr>
+      <p:pic>
+        <p:nvPicPr>
+          <p:cNvPr id="4" name="Grafik 3"/>
+          <p:cNvPicPr>
+            <a:picLocks noChangeAspect="1"/>
+          </p:cNvPicPr>
+          <p:nvPr/>
+        </p:nvPicPr>
+        <p:blipFill>
+          <a:blip r:embed="rId2">
+            <a:clrChange>
+              <a:clrFrom>
+                <a:srgbClr val="FFFFFF"/>
+              </a:clrFrom>
+              <a:clrTo>
+                <a:srgbClr val="FFFFFF">
+                  <a:alpha val="0"/>
+                </a:srgbClr>
+              </a:clrTo>
+            </a:clrChange>
+            <a:extLst>
+              <a:ext uri="{28A0092B-C50C-407E-A947-70E740481C1C}">
+                <a14:useLocalDpi xmlns:a14="http://schemas.microsoft.com/office/drawing/2010/main" val="0"/>
+              </a:ext>
+            </a:extLst>
+          </a:blip>
+          <a:stretch>
+            <a:fillRect/>
+          </a:stretch>
+        </p:blipFill>
+        <p:spPr>
+          <a:xfrm>
+            <a:off x="1187624" y="1052736"/>
+            <a:ext cx="666843" cy="666843"/>
+          </a:xfrm>
+          <a:prstGeom prst="rect">
+            <a:avLst/>
+          </a:prstGeom>
+        </p:spPr>
+      </p:pic>
+      <p:pic>
+        <p:nvPicPr>
+          <p:cNvPr id="5" name="Grafik 4"/>
+          <p:cNvPicPr>
+            <a:picLocks noChangeAspect="1"/>
+          </p:cNvPicPr>
+          <p:nvPr/>
+        </p:nvPicPr>
+        <p:blipFill>
+          <a:blip r:embed="rId3">
+            <a:clrChange>
+              <a:clrFrom>
+                <a:srgbClr val="FFFFFF"/>
+              </a:clrFrom>
+              <a:clrTo>
+                <a:srgbClr val="FFFFFF">
+                  <a:alpha val="0"/>
+                </a:srgbClr>
+              </a:clrTo>
+            </a:clrChange>
+            <a:extLst>
+              <a:ext uri="{28A0092B-C50C-407E-A947-70E740481C1C}">
+                <a14:useLocalDpi xmlns:a14="http://schemas.microsoft.com/office/drawing/2010/main" val="0"/>
+              </a:ext>
+            </a:extLst>
+          </a:blip>
+          <a:stretch>
+            <a:fillRect/>
+          </a:stretch>
+        </p:blipFill>
+        <p:spPr>
+          <a:xfrm>
+            <a:off x="4238578" y="3095578"/>
+            <a:ext cx="666843" cy="666843"/>
+          </a:xfrm>
+          <a:prstGeom prst="rect">
+            <a:avLst/>
+          </a:prstGeom>
+        </p:spPr>
+      </p:pic>
+    </p:spTree>
+    <p:extLst>
+      <p:ext uri="{BB962C8B-B14F-4D97-AF65-F5344CB8AC3E}">
+        <p14:creationId xmlns:p14="http://schemas.microsoft.com/office/powerpoint/2010/main" val="1904105880"/>
       </p:ext>
     </p:extLst>
   </p:cSld>

</xml_diff>